<commit_message>
add prec rec metrics and etc
</commit_message>
<xml_diff>
--- a/reports/final_report/rep_final.pptx
+++ b/reports/final_report/rep_final.pptx
@@ -13,6 +13,9 @@
     <p:sldId id="262" r:id="rId7"/>
     <p:sldId id="264" r:id="rId8"/>
     <p:sldId id="263" r:id="rId9"/>
+    <p:sldId id="265" r:id="rId10"/>
+    <p:sldId id="266" r:id="rId11"/>
+    <p:sldId id="267" r:id="rId12"/>
   </p:sldIdLst>
   <p:sldSz cx="12192000" cy="6858000"/>
   <p:notesSz cx="6858000" cy="9144000"/>
@@ -111,6 +114,11 @@
       </a:defRPr>
     </a:lvl9pPr>
   </p:defaultTextStyle>
+  <p:extLst>
+    <p:ext uri="{EFAFB233-063F-42B5-8137-9DF3F51BA10A}">
+      <p15:sldGuideLst xmlns:p15="http://schemas.microsoft.com/office/powerpoint/2012/main"/>
+    </p:ext>
+  </p:extLst>
 </p:presentation>
 </file>
 
@@ -306,7 +314,7 @@
           <a:p>
             <a:fld id="{8E181919-6A44-4E28-9780-FA7AF2B9EF29}" type="datetimeFigureOut">
               <a:rPr lang="ru-RU" smtClean="0"/>
-              <a:t>14.11.2021</a:t>
+              <a:t>15.11.2021</a:t>
             </a:fld>
             <a:endParaRPr lang="ru-RU"/>
           </a:p>
@@ -496,7 +504,7 @@
           <a:p>
             <a:fld id="{8E181919-6A44-4E28-9780-FA7AF2B9EF29}" type="datetimeFigureOut">
               <a:rPr lang="ru-RU" smtClean="0"/>
-              <a:t>14.11.2021</a:t>
+              <a:t>15.11.2021</a:t>
             </a:fld>
             <a:endParaRPr lang="ru-RU"/>
           </a:p>
@@ -676,7 +684,7 @@
           <a:p>
             <a:fld id="{8E181919-6A44-4E28-9780-FA7AF2B9EF29}" type="datetimeFigureOut">
               <a:rPr lang="ru-RU" smtClean="0"/>
-              <a:t>14.11.2021</a:t>
+              <a:t>15.11.2021</a:t>
             </a:fld>
             <a:endParaRPr lang="ru-RU"/>
           </a:p>
@@ -846,7 +854,7 @@
           <a:p>
             <a:fld id="{8E181919-6A44-4E28-9780-FA7AF2B9EF29}" type="datetimeFigureOut">
               <a:rPr lang="ru-RU" smtClean="0"/>
-              <a:t>14.11.2021</a:t>
+              <a:t>15.11.2021</a:t>
             </a:fld>
             <a:endParaRPr lang="ru-RU"/>
           </a:p>
@@ -1102,7 +1110,7 @@
           <a:p>
             <a:fld id="{8E181919-6A44-4E28-9780-FA7AF2B9EF29}" type="datetimeFigureOut">
               <a:rPr lang="ru-RU" smtClean="0"/>
-              <a:t>14.11.2021</a:t>
+              <a:t>15.11.2021</a:t>
             </a:fld>
             <a:endParaRPr lang="ru-RU"/>
           </a:p>
@@ -1390,7 +1398,7 @@
           <a:p>
             <a:fld id="{8E181919-6A44-4E28-9780-FA7AF2B9EF29}" type="datetimeFigureOut">
               <a:rPr lang="ru-RU" smtClean="0"/>
-              <a:t>14.11.2021</a:t>
+              <a:t>15.11.2021</a:t>
             </a:fld>
             <a:endParaRPr lang="ru-RU"/>
           </a:p>
@@ -1828,7 +1836,7 @@
           <a:p>
             <a:fld id="{8E181919-6A44-4E28-9780-FA7AF2B9EF29}" type="datetimeFigureOut">
               <a:rPr lang="ru-RU" smtClean="0"/>
-              <a:t>14.11.2021</a:t>
+              <a:t>15.11.2021</a:t>
             </a:fld>
             <a:endParaRPr lang="ru-RU"/>
           </a:p>
@@ -1946,7 +1954,7 @@
           <a:p>
             <a:fld id="{8E181919-6A44-4E28-9780-FA7AF2B9EF29}" type="datetimeFigureOut">
               <a:rPr lang="ru-RU" smtClean="0"/>
-              <a:t>14.11.2021</a:t>
+              <a:t>15.11.2021</a:t>
             </a:fld>
             <a:endParaRPr lang="ru-RU"/>
           </a:p>
@@ -2041,7 +2049,7 @@
           <a:p>
             <a:fld id="{8E181919-6A44-4E28-9780-FA7AF2B9EF29}" type="datetimeFigureOut">
               <a:rPr lang="ru-RU" smtClean="0"/>
-              <a:t>14.11.2021</a:t>
+              <a:t>15.11.2021</a:t>
             </a:fld>
             <a:endParaRPr lang="ru-RU"/>
           </a:p>
@@ -2397,7 +2405,7 @@
           <a:p>
             <a:fld id="{8E181919-6A44-4E28-9780-FA7AF2B9EF29}" type="datetimeFigureOut">
               <a:rPr lang="ru-RU" smtClean="0"/>
-              <a:t>14.11.2021</a:t>
+              <a:t>15.11.2021</a:t>
             </a:fld>
             <a:endParaRPr lang="ru-RU"/>
           </a:p>
@@ -2705,7 +2713,7 @@
           <a:p>
             <a:fld id="{8E181919-6A44-4E28-9780-FA7AF2B9EF29}" type="datetimeFigureOut">
               <a:rPr lang="ru-RU" smtClean="0"/>
-              <a:t>14.11.2021</a:t>
+              <a:t>15.11.2021</a:t>
             </a:fld>
             <a:endParaRPr lang="ru-RU"/>
           </a:p>
@@ -2941,7 +2949,7 @@
           <a:p>
             <a:fld id="{8E181919-6A44-4E28-9780-FA7AF2B9EF29}" type="datetimeFigureOut">
               <a:rPr lang="ru-RU" smtClean="0"/>
-              <a:t>14.11.2021</a:t>
+              <a:t>15.11.2021</a:t>
             </a:fld>
             <a:endParaRPr lang="ru-RU"/>
           </a:p>
@@ -3512,6 +3520,584 @@
 </p:sld>
 </file>
 
+<file path=ppt/slides/slide10.xml><?xml version="1.0" encoding="utf-8"?>
+<p:sld xmlns:a="http://schemas.openxmlformats.org/drawingml/2006/main" xmlns:r="http://schemas.openxmlformats.org/officeDocument/2006/relationships" xmlns:p="http://schemas.openxmlformats.org/presentationml/2006/main">
+  <p:cSld>
+    <p:spTree>
+      <p:nvGrpSpPr>
+        <p:cNvPr id="1" name=""/>
+        <p:cNvGrpSpPr/>
+        <p:nvPr/>
+      </p:nvGrpSpPr>
+      <p:grpSpPr>
+        <a:xfrm>
+          <a:off x="0" y="0"/>
+          <a:ext cx="0" cy="0"/>
+          <a:chOff x="0" y="0"/>
+          <a:chExt cx="0" cy="0"/>
+        </a:xfrm>
+      </p:grpSpPr>
+      <p:sp>
+        <p:nvSpPr>
+          <p:cNvPr id="2" name="Заголовок 1">
+            <a:extLst>
+              <a:ext uri="{FF2B5EF4-FFF2-40B4-BE49-F238E27FC236}">
+                <a16:creationId xmlns:a16="http://schemas.microsoft.com/office/drawing/2014/main" id="{1D5ABEB9-EC30-4BFF-889B-D5AD2601C96D}"/>
+              </a:ext>
+            </a:extLst>
+          </p:cNvPr>
+          <p:cNvSpPr>
+            <a:spLocks noGrp="1"/>
+          </p:cNvSpPr>
+          <p:nvPr>
+            <p:ph type="title"/>
+          </p:nvPr>
+        </p:nvSpPr>
+        <p:spPr>
+          <a:xfrm>
+            <a:off x="0" y="0"/>
+            <a:ext cx="10772775" cy="862542"/>
+          </a:xfrm>
+        </p:spPr>
+        <p:txBody>
+          <a:bodyPr>
+            <a:normAutofit fontScale="90000"/>
+          </a:bodyPr>
+          <a:lstStyle/>
+          <a:p>
+            <a:r>
+              <a:rPr lang="ru-RU" sz="4000" b="1" dirty="0">
+                <a:solidFill>
+                  <a:schemeClr val="tx1"/>
+                </a:solidFill>
+              </a:rPr>
+              <a:t>Семинары</a:t>
+            </a:r>
+            <a:br>
+              <a:rPr lang="ru-RU" sz="4000" b="1" dirty="0">
+                <a:solidFill>
+                  <a:schemeClr val="tx1"/>
+                </a:solidFill>
+              </a:rPr>
+            </a:br>
+            <a:r>
+              <a:rPr lang="ru-RU" sz="3000" b="1" dirty="0" smtClean="0">
+                <a:solidFill>
+                  <a:schemeClr val="tx1"/>
+                </a:solidFill>
+              </a:rPr>
+              <a:t>Прогнозирование и классификация временных рядов. Доклад.</a:t>
+            </a:r>
+            <a:endParaRPr lang="ru-RU" sz="3000" b="1" dirty="0">
+              <a:solidFill>
+                <a:schemeClr val="tx1"/>
+              </a:solidFill>
+            </a:endParaRPr>
+          </a:p>
+        </p:txBody>
+      </p:sp>
+      <p:sp>
+        <p:nvSpPr>
+          <p:cNvPr id="6" name="Объект 5">
+            <a:extLst>
+              <a:ext uri="{FF2B5EF4-FFF2-40B4-BE49-F238E27FC236}">
+                <a16:creationId xmlns:a16="http://schemas.microsoft.com/office/drawing/2014/main" id="{1F50CAFC-03E4-4949-B9A9-538EDB2BD8FF}"/>
+              </a:ext>
+            </a:extLst>
+          </p:cNvPr>
+          <p:cNvSpPr>
+            <a:spLocks noGrp="1"/>
+          </p:cNvSpPr>
+          <p:nvPr>
+            <p:ph sz="half" idx="1"/>
+          </p:nvPr>
+        </p:nvSpPr>
+        <p:spPr/>
+        <p:txBody>
+          <a:bodyPr>
+            <a:normAutofit lnSpcReduction="10000"/>
+          </a:bodyPr>
+          <a:lstStyle/>
+          <a:p>
+            <a:pPr>
+              <a:buFont typeface="Arial" panose="020B0604020202020204" pitchFamily="34" charset="0"/>
+              <a:buChar char="•"/>
+            </a:pPr>
+            <a:r>
+              <a:rPr lang="en-US" dirty="0" smtClean="0">
+                <a:solidFill>
+                  <a:schemeClr val="tx1"/>
+                </a:solidFill>
+              </a:rPr>
+              <a:t> </a:t>
+            </a:r>
+            <a:r>
+              <a:rPr lang="ru-RU" dirty="0" smtClean="0">
+                <a:solidFill>
+                  <a:schemeClr val="tx1"/>
+                </a:solidFill>
+              </a:rPr>
+              <a:t>понятие стационарности и типы процессов</a:t>
+            </a:r>
+            <a:r>
+              <a:rPr lang="en-US" dirty="0" smtClean="0">
+                <a:solidFill>
+                  <a:schemeClr val="tx1"/>
+                </a:solidFill>
+              </a:rPr>
+              <a:t>;</a:t>
+            </a:r>
+          </a:p>
+          <a:p>
+            <a:pPr>
+              <a:buFont typeface="Arial" panose="020B0604020202020204" pitchFamily="34" charset="0"/>
+              <a:buChar char="•"/>
+            </a:pPr>
+            <a:r>
+              <a:rPr lang="en-US" dirty="0">
+                <a:solidFill>
+                  <a:schemeClr val="tx1"/>
+                </a:solidFill>
+              </a:rPr>
+              <a:t> </a:t>
+            </a:r>
+            <a:r>
+              <a:rPr lang="ru-RU" dirty="0" smtClean="0">
+                <a:solidFill>
+                  <a:schemeClr val="tx1"/>
+                </a:solidFill>
+              </a:rPr>
+              <a:t>процесс случайного блуждания</a:t>
+            </a:r>
+            <a:r>
+              <a:rPr lang="en-US" dirty="0" smtClean="0">
+                <a:solidFill>
+                  <a:schemeClr val="tx1"/>
+                </a:solidFill>
+              </a:rPr>
+              <a:t>;</a:t>
+            </a:r>
+            <a:endParaRPr lang="ru-RU" dirty="0" smtClean="0">
+              <a:solidFill>
+                <a:schemeClr val="tx1"/>
+              </a:solidFill>
+            </a:endParaRPr>
+          </a:p>
+          <a:p>
+            <a:pPr>
+              <a:buFont typeface="Arial" panose="020B0604020202020204" pitchFamily="34" charset="0"/>
+              <a:buChar char="•"/>
+            </a:pPr>
+            <a:r>
+              <a:rPr lang="ru-RU" dirty="0">
+                <a:solidFill>
+                  <a:schemeClr val="tx1"/>
+                </a:solidFill>
+              </a:rPr>
+              <a:t> </a:t>
+            </a:r>
+            <a:r>
+              <a:rPr lang="ru-RU" dirty="0" smtClean="0">
+                <a:solidFill>
+                  <a:schemeClr val="tx1"/>
+                </a:solidFill>
+              </a:rPr>
+              <a:t>процесс с детерминированной составляющей</a:t>
+            </a:r>
+            <a:r>
+              <a:rPr lang="en-US" dirty="0" smtClean="0">
+                <a:solidFill>
+                  <a:schemeClr val="tx1"/>
+                </a:solidFill>
+              </a:rPr>
+              <a:t>;</a:t>
+            </a:r>
+          </a:p>
+          <a:p>
+            <a:pPr>
+              <a:buFont typeface="Arial" panose="020B0604020202020204" pitchFamily="34" charset="0"/>
+              <a:buChar char="•"/>
+            </a:pPr>
+            <a:r>
+              <a:rPr lang="en-US" dirty="0">
+                <a:solidFill>
+                  <a:schemeClr val="tx1"/>
+                </a:solidFill>
+              </a:rPr>
+              <a:t> </a:t>
+            </a:r>
+            <a:r>
+              <a:rPr lang="ru-RU" dirty="0" smtClean="0">
+                <a:solidFill>
+                  <a:schemeClr val="tx1"/>
+                </a:solidFill>
+              </a:rPr>
+              <a:t>тест на стационарность</a:t>
+            </a:r>
+            <a:r>
+              <a:rPr lang="en-US" dirty="0" smtClean="0">
+                <a:solidFill>
+                  <a:schemeClr val="tx1"/>
+                </a:solidFill>
+              </a:rPr>
+              <a:t>;</a:t>
+            </a:r>
+            <a:endParaRPr lang="ru-RU" dirty="0" smtClean="0">
+              <a:solidFill>
+                <a:schemeClr val="tx1"/>
+              </a:solidFill>
+            </a:endParaRPr>
+          </a:p>
+          <a:p>
+            <a:pPr>
+              <a:buFont typeface="Arial" panose="020B0604020202020204" pitchFamily="34" charset="0"/>
+              <a:buChar char="•"/>
+            </a:pPr>
+            <a:r>
+              <a:rPr lang="ru-RU" dirty="0">
+                <a:solidFill>
+                  <a:schemeClr val="tx1"/>
+                </a:solidFill>
+              </a:rPr>
+              <a:t> </a:t>
+            </a:r>
+            <a:r>
+              <a:rPr lang="ru-RU" dirty="0" smtClean="0">
+                <a:solidFill>
+                  <a:schemeClr val="tx1"/>
+                </a:solidFill>
+              </a:rPr>
+              <a:t>сезонность</a:t>
+            </a:r>
+            <a:r>
+              <a:rPr lang="en-US" dirty="0" smtClean="0">
+                <a:solidFill>
+                  <a:schemeClr val="tx1"/>
+                </a:solidFill>
+              </a:rPr>
+              <a:t>;</a:t>
+            </a:r>
+          </a:p>
+          <a:p>
+            <a:pPr>
+              <a:buFont typeface="Arial" panose="020B0604020202020204" pitchFamily="34" charset="0"/>
+              <a:buChar char="•"/>
+            </a:pPr>
+            <a:r>
+              <a:rPr lang="ru-RU" dirty="0">
+                <a:solidFill>
+                  <a:schemeClr val="tx1"/>
+                </a:solidFill>
+              </a:rPr>
+              <a:t> </a:t>
+            </a:r>
+            <a:r>
+              <a:rPr lang="ru-RU" dirty="0" smtClean="0">
+                <a:solidFill>
+                  <a:schemeClr val="tx1"/>
+                </a:solidFill>
+              </a:rPr>
+              <a:t>семейство </a:t>
+            </a:r>
+            <a:r>
+              <a:rPr lang="en-US" dirty="0" smtClean="0">
+                <a:solidFill>
+                  <a:schemeClr val="tx1"/>
+                </a:solidFill>
+              </a:rPr>
+              <a:t>ARMA </a:t>
+            </a:r>
+            <a:r>
+              <a:rPr lang="ru-RU" dirty="0" smtClean="0">
+                <a:solidFill>
+                  <a:schemeClr val="tx1"/>
+                </a:solidFill>
+              </a:rPr>
+              <a:t>моделей</a:t>
+            </a:r>
+            <a:r>
+              <a:rPr lang="en-US" dirty="0" smtClean="0">
+                <a:solidFill>
+                  <a:schemeClr val="tx1"/>
+                </a:solidFill>
+              </a:rPr>
+              <a:t>;</a:t>
+            </a:r>
+          </a:p>
+          <a:p>
+            <a:pPr>
+              <a:buFont typeface="Arial" panose="020B0604020202020204" pitchFamily="34" charset="0"/>
+              <a:buChar char="•"/>
+            </a:pPr>
+            <a:r>
+              <a:rPr lang="ru-RU" dirty="0">
+                <a:solidFill>
+                  <a:schemeClr val="tx1"/>
+                </a:solidFill>
+              </a:rPr>
+              <a:t> </a:t>
+            </a:r>
+            <a:r>
+              <a:rPr lang="en-US" dirty="0" smtClean="0">
+                <a:solidFill>
+                  <a:schemeClr val="tx1"/>
+                </a:solidFill>
+              </a:rPr>
+              <a:t>Recurrent neural networks</a:t>
+            </a:r>
+            <a:r>
+              <a:rPr lang="en-US" dirty="0">
+                <a:solidFill>
+                  <a:schemeClr val="tx1"/>
+                </a:solidFill>
+              </a:rPr>
+              <a:t>.</a:t>
+            </a:r>
+            <a:endParaRPr lang="en-US" dirty="0" smtClean="0">
+              <a:solidFill>
+                <a:schemeClr val="tx1"/>
+              </a:solidFill>
+            </a:endParaRPr>
+          </a:p>
+        </p:txBody>
+      </p:sp>
+      <p:pic>
+        <p:nvPicPr>
+          <p:cNvPr id="9" name="Рисунок 8">
+            <a:extLst>
+              <a:ext uri="{FF2B5EF4-FFF2-40B4-BE49-F238E27FC236}">
+                <a16:creationId xmlns:a16="http://schemas.microsoft.com/office/drawing/2014/main" id="{00000000-0000-0000-0000-000000000000}"/>
+              </a:ext>
+            </a:extLst>
+          </p:cNvPr>
+          <p:cNvPicPr>
+            <a:picLocks noChangeAspect="1"/>
+          </p:cNvPicPr>
+          <p:nvPr/>
+        </p:nvPicPr>
+        <p:blipFill>
+          <a:blip r:embed="rId2">
+            <a:lum/>
+            <a:alphaModFix/>
+          </a:blip>
+          <a:srcRect/>
+          <a:stretch>
+            <a:fillRect/>
+          </a:stretch>
+        </p:blipFill>
+        <p:spPr>
+          <a:xfrm>
+            <a:off x="7243759" y="1221203"/>
+            <a:ext cx="3529015" cy="2463858"/>
+          </a:xfrm>
+          <a:prstGeom prst="rect">
+            <a:avLst/>
+          </a:prstGeom>
+          <a:noFill/>
+          <a:ln>
+            <a:noFill/>
+          </a:ln>
+        </p:spPr>
+      </p:pic>
+      <p:pic>
+        <p:nvPicPr>
+          <p:cNvPr id="11" name="Рисунок 10">
+            <a:extLst>
+              <a:ext uri="{FF2B5EF4-FFF2-40B4-BE49-F238E27FC236}">
+                <a16:creationId xmlns:a16="http://schemas.microsoft.com/office/drawing/2014/main" id="{00000000-0000-0000-0000-000000000000}"/>
+              </a:ext>
+            </a:extLst>
+          </p:cNvPr>
+          <p:cNvPicPr>
+            <a:picLocks noChangeAspect="1"/>
+          </p:cNvPicPr>
+          <p:nvPr/>
+        </p:nvPicPr>
+        <p:blipFill>
+          <a:blip r:embed="rId3">
+            <a:lum/>
+            <a:alphaModFix/>
+          </a:blip>
+          <a:srcRect/>
+          <a:stretch>
+            <a:fillRect/>
+          </a:stretch>
+        </p:blipFill>
+        <p:spPr>
+          <a:xfrm>
+            <a:off x="7243758" y="3567472"/>
+            <a:ext cx="3529015" cy="2474765"/>
+          </a:xfrm>
+          <a:prstGeom prst="rect">
+            <a:avLst/>
+          </a:prstGeom>
+          <a:noFill/>
+          <a:ln>
+            <a:noFill/>
+          </a:ln>
+        </p:spPr>
+      </p:pic>
+    </p:spTree>
+    <p:extLst>
+      <p:ext uri="{BB962C8B-B14F-4D97-AF65-F5344CB8AC3E}">
+        <p14:creationId xmlns:p14="http://schemas.microsoft.com/office/powerpoint/2010/main" val="3241869163"/>
+      </p:ext>
+    </p:extLst>
+  </p:cSld>
+  <p:clrMapOvr>
+    <a:masterClrMapping/>
+  </p:clrMapOvr>
+</p:sld>
+</file>
+
+<file path=ppt/slides/slide11.xml><?xml version="1.0" encoding="utf-8"?>
+<p:sld xmlns:a="http://schemas.openxmlformats.org/drawingml/2006/main" xmlns:r="http://schemas.openxmlformats.org/officeDocument/2006/relationships" xmlns:p="http://schemas.openxmlformats.org/presentationml/2006/main">
+  <p:cSld>
+    <p:spTree>
+      <p:nvGrpSpPr>
+        <p:cNvPr id="1" name=""/>
+        <p:cNvGrpSpPr/>
+        <p:nvPr/>
+      </p:nvGrpSpPr>
+      <p:grpSpPr>
+        <a:xfrm>
+          <a:off x="0" y="0"/>
+          <a:ext cx="0" cy="0"/>
+          <a:chOff x="0" y="0"/>
+          <a:chExt cx="0" cy="0"/>
+        </a:xfrm>
+      </p:grpSpPr>
+      <p:sp>
+        <p:nvSpPr>
+          <p:cNvPr id="2" name="Заголовок 1">
+            <a:extLst>
+              <a:ext uri="{FF2B5EF4-FFF2-40B4-BE49-F238E27FC236}">
+                <a16:creationId xmlns:a16="http://schemas.microsoft.com/office/drawing/2014/main" id="{1D5ABEB9-EC30-4BFF-889B-D5AD2601C96D}"/>
+              </a:ext>
+            </a:extLst>
+          </p:cNvPr>
+          <p:cNvSpPr>
+            <a:spLocks noGrp="1"/>
+          </p:cNvSpPr>
+          <p:nvPr>
+            <p:ph type="title"/>
+          </p:nvPr>
+        </p:nvSpPr>
+        <p:spPr>
+          <a:xfrm>
+            <a:off x="0" y="0"/>
+            <a:ext cx="10772775" cy="862542"/>
+          </a:xfrm>
+        </p:spPr>
+        <p:txBody>
+          <a:bodyPr>
+            <a:normAutofit fontScale="90000"/>
+          </a:bodyPr>
+          <a:lstStyle/>
+          <a:p>
+            <a:r>
+              <a:rPr lang="ru-RU" sz="4000" b="1" dirty="0">
+                <a:solidFill>
+                  <a:schemeClr val="tx1"/>
+                </a:solidFill>
+              </a:rPr>
+              <a:t>Семинары</a:t>
+            </a:r>
+            <a:br>
+              <a:rPr lang="ru-RU" sz="4000" b="1" dirty="0">
+                <a:solidFill>
+                  <a:schemeClr val="tx1"/>
+                </a:solidFill>
+              </a:rPr>
+            </a:br>
+            <a:r>
+              <a:rPr lang="ru-RU" sz="3000" b="1" dirty="0" smtClean="0">
+                <a:solidFill>
+                  <a:schemeClr val="tx1"/>
+                </a:solidFill>
+              </a:rPr>
+              <a:t>Прогнозирование и классификация временных рядов. </a:t>
+            </a:r>
+            <a:r>
+              <a:rPr lang="en-US" sz="3000" b="1" dirty="0" smtClean="0">
+                <a:solidFill>
+                  <a:schemeClr val="tx1"/>
+                </a:solidFill>
+              </a:rPr>
+              <a:t>Workshop</a:t>
+            </a:r>
+            <a:r>
+              <a:rPr lang="ru-RU" sz="3000" b="1" dirty="0" smtClean="0">
+                <a:solidFill>
+                  <a:schemeClr val="tx1"/>
+                </a:solidFill>
+              </a:rPr>
+              <a:t>.</a:t>
+            </a:r>
+            <a:endParaRPr lang="ru-RU" sz="3000" b="1" dirty="0">
+              <a:solidFill>
+                <a:schemeClr val="tx1"/>
+              </a:solidFill>
+            </a:endParaRPr>
+          </a:p>
+        </p:txBody>
+      </p:sp>
+      <p:sp>
+        <p:nvSpPr>
+          <p:cNvPr id="3" name="Объект 2"/>
+          <p:cNvSpPr>
+            <a:spLocks noGrp="1"/>
+          </p:cNvSpPr>
+          <p:nvPr>
+            <p:ph sz="half" idx="1"/>
+          </p:nvPr>
+        </p:nvSpPr>
+        <p:spPr/>
+        <p:txBody>
+          <a:bodyPr/>
+          <a:lstStyle/>
+          <a:p>
+            <a:endParaRPr lang="ru-RU"/>
+          </a:p>
+        </p:txBody>
+      </p:sp>
+      <p:sp>
+        <p:nvSpPr>
+          <p:cNvPr id="7" name="Объект 2"/>
+          <p:cNvSpPr>
+            <a:spLocks noGrp="1"/>
+          </p:cNvSpPr>
+          <p:nvPr>
+            <p:ph sz="half" idx="1"/>
+          </p:nvPr>
+        </p:nvSpPr>
+        <p:spPr>
+          <a:xfrm>
+            <a:off x="6886956" y="1998134"/>
+            <a:ext cx="4663440" cy="3767328"/>
+          </a:xfrm>
+        </p:spPr>
+        <p:txBody>
+          <a:bodyPr/>
+          <a:lstStyle/>
+          <a:p>
+            <a:endParaRPr lang="ru-RU"/>
+          </a:p>
+        </p:txBody>
+      </p:sp>
+    </p:spTree>
+    <p:extLst>
+      <p:ext uri="{BB962C8B-B14F-4D97-AF65-F5344CB8AC3E}">
+        <p14:creationId xmlns:p14="http://schemas.microsoft.com/office/powerpoint/2010/main" val="150753651"/>
+      </p:ext>
+    </p:extLst>
+  </p:cSld>
+  <p:clrMapOvr>
+    <a:masterClrMapping/>
+  </p:clrMapOvr>
+</p:sld>
+</file>
+
 <file path=ppt/slides/slide2.xml><?xml version="1.0" encoding="utf-8"?>
 <p:sld xmlns:a="http://schemas.openxmlformats.org/drawingml/2006/main" xmlns:r="http://schemas.openxmlformats.org/officeDocument/2006/relationships" xmlns:p="http://schemas.openxmlformats.org/presentationml/2006/main">
   <p:cSld>
@@ -4412,7 +4998,12 @@
             <p:ph type="title"/>
           </p:nvPr>
         </p:nvSpPr>
-        <p:spPr/>
+        <p:spPr>
+          <a:xfrm>
+            <a:off x="0" y="0"/>
+            <a:ext cx="10772775" cy="1014942"/>
+          </a:xfrm>
+        </p:spPr>
         <p:txBody>
           <a:bodyPr>
             <a:normAutofit/>
@@ -4951,10 +5542,15 @@
             <p:ph type="title"/>
           </p:nvPr>
         </p:nvSpPr>
-        <p:spPr/>
+        <p:spPr>
+          <a:xfrm>
+            <a:off x="0" y="0"/>
+            <a:ext cx="10772775" cy="957792"/>
+          </a:xfrm>
+        </p:spPr>
         <p:txBody>
           <a:bodyPr>
-            <a:normAutofit/>
+            <a:normAutofit fontScale="90000"/>
           </a:bodyPr>
           <a:lstStyle/>
           <a:p>
@@ -5300,13 +5896,7 @@
       </p:sp>
       <p:pic>
         <p:nvPicPr>
-          <p:cNvPr id="16" name="Объект 15">
-            <a:extLst>
-              <a:ext uri="{FF2B5EF4-FFF2-40B4-BE49-F238E27FC236}">
-                <a16:creationId xmlns:a16="http://schemas.microsoft.com/office/drawing/2014/main" id="{B67EBE86-2F91-463C-B728-D57FE6B6F2D6}"/>
-              </a:ext>
-            </a:extLst>
-          </p:cNvPr>
+          <p:cNvPr id="8" name="Объект 7"/>
           <p:cNvPicPr>
             <a:picLocks noGrp="1" noChangeAspect="1"/>
           </p:cNvPicPr>
@@ -5328,8 +5918,8 @@
         </p:blipFill>
         <p:spPr>
           <a:xfrm>
-            <a:off x="2560320" y="1280160"/>
-            <a:ext cx="6705599" cy="4611332"/>
+            <a:off x="2895029" y="1049983"/>
+            <a:ext cx="4789448" cy="4935626"/>
           </a:xfrm>
         </p:spPr>
       </p:pic>
@@ -6375,6 +6965,389 @@
     <p:extLst>
       <p:ext uri="{BB962C8B-B14F-4D97-AF65-F5344CB8AC3E}">
         <p14:creationId xmlns:p14="http://schemas.microsoft.com/office/powerpoint/2010/main" val="479064586"/>
+      </p:ext>
+    </p:extLst>
+  </p:cSld>
+  <p:clrMapOvr>
+    <a:masterClrMapping/>
+  </p:clrMapOvr>
+</p:sld>
+</file>
+
+<file path=ppt/slides/slide9.xml><?xml version="1.0" encoding="utf-8"?>
+<p:sld xmlns:a="http://schemas.openxmlformats.org/drawingml/2006/main" xmlns:r="http://schemas.openxmlformats.org/officeDocument/2006/relationships" xmlns:p="http://schemas.openxmlformats.org/presentationml/2006/main">
+  <p:cSld>
+    <p:spTree>
+      <p:nvGrpSpPr>
+        <p:cNvPr id="1" name=""/>
+        <p:cNvGrpSpPr/>
+        <p:nvPr/>
+      </p:nvGrpSpPr>
+      <p:grpSpPr>
+        <a:xfrm>
+          <a:off x="0" y="0"/>
+          <a:ext cx="0" cy="0"/>
+          <a:chOff x="0" y="0"/>
+          <a:chExt cx="0" cy="0"/>
+        </a:xfrm>
+      </p:grpSpPr>
+      <p:sp>
+        <p:nvSpPr>
+          <p:cNvPr id="2" name="Заголовок 1">
+            <a:extLst>
+              <a:ext uri="{FF2B5EF4-FFF2-40B4-BE49-F238E27FC236}">
+                <a16:creationId xmlns:a16="http://schemas.microsoft.com/office/drawing/2014/main" id="{1D5ABEB9-EC30-4BFF-889B-D5AD2601C96D}"/>
+              </a:ext>
+            </a:extLst>
+          </p:cNvPr>
+          <p:cNvSpPr>
+            <a:spLocks noGrp="1"/>
+          </p:cNvSpPr>
+          <p:nvPr>
+            <p:ph type="title"/>
+          </p:nvPr>
+        </p:nvSpPr>
+        <p:spPr>
+          <a:xfrm>
+            <a:off x="0" y="0"/>
+            <a:ext cx="10772775" cy="853017"/>
+          </a:xfrm>
+        </p:spPr>
+        <p:txBody>
+          <a:bodyPr>
+            <a:normAutofit fontScale="90000"/>
+          </a:bodyPr>
+          <a:lstStyle/>
+          <a:p>
+            <a:r>
+              <a:rPr lang="ru-RU" sz="4000" b="1" dirty="0">
+                <a:solidFill>
+                  <a:schemeClr val="tx1"/>
+                </a:solidFill>
+              </a:rPr>
+              <a:t>Семинары.</a:t>
+            </a:r>
+            <a:br>
+              <a:rPr lang="ru-RU" sz="4000" b="1" dirty="0">
+                <a:solidFill>
+                  <a:schemeClr val="tx1"/>
+                </a:solidFill>
+              </a:rPr>
+            </a:br>
+            <a:r>
+              <a:rPr lang="ru-RU" sz="3000" b="1" dirty="0">
+                <a:solidFill>
+                  <a:schemeClr val="tx1"/>
+                </a:solidFill>
+              </a:rPr>
+              <a:t>Рекомендательные системы. </a:t>
+            </a:r>
+            <a:r>
+              <a:rPr lang="en-US" sz="3000" b="1" dirty="0" smtClean="0">
+                <a:solidFill>
+                  <a:schemeClr val="tx1"/>
+                </a:solidFill>
+              </a:rPr>
+              <a:t>Workshop</a:t>
+            </a:r>
+            <a:r>
+              <a:rPr lang="ru-RU" sz="3000" b="1" dirty="0" smtClean="0">
+                <a:solidFill>
+                  <a:schemeClr val="tx1"/>
+                </a:solidFill>
+              </a:rPr>
+              <a:t>.</a:t>
+            </a:r>
+            <a:endParaRPr lang="ru-RU" sz="3000" b="1" dirty="0">
+              <a:solidFill>
+                <a:schemeClr val="tx1"/>
+              </a:solidFill>
+            </a:endParaRPr>
+          </a:p>
+        </p:txBody>
+      </p:sp>
+      <p:graphicFrame>
+        <p:nvGraphicFramePr>
+          <p:cNvPr id="10" name="Объект 9"/>
+          <p:cNvGraphicFramePr>
+            <a:graphicFrameLocks noGrp="1"/>
+          </p:cNvGraphicFramePr>
+          <p:nvPr>
+            <p:ph sz="half" idx="1"/>
+            <p:extLst>
+              <p:ext uri="{D42A27DB-BD31-4B8C-83A1-F6EECF244321}">
+                <p14:modId xmlns:p14="http://schemas.microsoft.com/office/powerpoint/2010/main" val="3085808158"/>
+              </p:ext>
+            </p:extLst>
+          </p:nvPr>
+        </p:nvGraphicFramePr>
+        <p:xfrm>
+          <a:off x="2619373" y="1293492"/>
+          <a:ext cx="5665428" cy="741680"/>
+        </p:xfrm>
+        <a:graphic>
+          <a:graphicData uri="http://schemas.openxmlformats.org/drawingml/2006/table">
+            <a:tbl>
+              <a:tblPr firstRow="1" bandRow="1">
+                <a:tableStyleId>{5C22544A-7EE6-4342-B048-85BDC9FD1C3A}</a:tableStyleId>
+              </a:tblPr>
+              <a:tblGrid>
+                <a:gridCol w="1416357">
+                  <a:extLst>
+                    <a:ext uri="{9D8B030D-6E8A-4147-A177-3AD203B41FA5}">
+                      <a16:colId xmlns:a16="http://schemas.microsoft.com/office/drawing/2014/main" val="3632553540"/>
+                    </a:ext>
+                  </a:extLst>
+                </a:gridCol>
+                <a:gridCol w="1416357">
+                  <a:extLst>
+                    <a:ext uri="{9D8B030D-6E8A-4147-A177-3AD203B41FA5}">
+                      <a16:colId xmlns:a16="http://schemas.microsoft.com/office/drawing/2014/main" val="2437699176"/>
+                    </a:ext>
+                  </a:extLst>
+                </a:gridCol>
+                <a:gridCol w="1416357">
+                  <a:extLst>
+                    <a:ext uri="{9D8B030D-6E8A-4147-A177-3AD203B41FA5}">
+                      <a16:colId xmlns:a16="http://schemas.microsoft.com/office/drawing/2014/main" val="249235384"/>
+                    </a:ext>
+                  </a:extLst>
+                </a:gridCol>
+                <a:gridCol w="1416357">
+                  <a:extLst>
+                    <a:ext uri="{9D8B030D-6E8A-4147-A177-3AD203B41FA5}">
+                      <a16:colId xmlns:a16="http://schemas.microsoft.com/office/drawing/2014/main" val="1739793482"/>
+                    </a:ext>
+                  </a:extLst>
+                </a:gridCol>
+              </a:tblGrid>
+              <a:tr h="370840">
+                <a:tc>
+                  <a:txBody>
+                    <a:bodyPr/>
+                    <a:lstStyle/>
+                    <a:p>
+                      <a:pPr algn="ctr"/>
+                      <a:r>
+                        <a:rPr lang="en-US" dirty="0" smtClean="0">
+                          <a:solidFill>
+                            <a:schemeClr val="tx1"/>
+                          </a:solidFill>
+                        </a:rPr>
+                        <a:t>-</a:t>
+                      </a:r>
+                      <a:endParaRPr lang="ru-RU" dirty="0">
+                        <a:solidFill>
+                          <a:schemeClr val="tx1"/>
+                        </a:solidFill>
+                      </a:endParaRPr>
+                    </a:p>
+                  </a:txBody>
+                  <a:tcPr/>
+                </a:tc>
+                <a:tc>
+                  <a:txBody>
+                    <a:bodyPr/>
+                    <a:lstStyle/>
+                    <a:p>
+                      <a:pPr algn="ctr"/>
+                      <a:r>
+                        <a:rPr lang="en-US" sz="1500" b="1" dirty="0" smtClean="0">
+                          <a:solidFill>
+                            <a:schemeClr val="tx1"/>
+                          </a:solidFill>
+                        </a:rPr>
+                        <a:t>Best</a:t>
+                      </a:r>
+                      <a:r>
+                        <a:rPr lang="en-US" sz="1500" b="1" baseline="0" dirty="0" smtClean="0">
+                          <a:solidFill>
+                            <a:schemeClr val="tx1"/>
+                          </a:solidFill>
+                        </a:rPr>
+                        <a:t> of </a:t>
+                      </a:r>
+                      <a:r>
+                        <a:rPr lang="en-US" sz="1500" b="1" baseline="0" dirty="0" err="1" smtClean="0">
+                          <a:solidFill>
+                            <a:schemeClr val="tx1"/>
+                          </a:solidFill>
+                        </a:rPr>
+                        <a:t>clust</a:t>
+                      </a:r>
+                      <a:endParaRPr lang="ru-RU" sz="1500" b="1" dirty="0">
+                        <a:solidFill>
+                          <a:schemeClr val="tx1"/>
+                        </a:solidFill>
+                      </a:endParaRPr>
+                    </a:p>
+                  </a:txBody>
+                  <a:tcPr/>
+                </a:tc>
+                <a:tc>
+                  <a:txBody>
+                    <a:bodyPr/>
+                    <a:lstStyle/>
+                    <a:p>
+                      <a:pPr algn="ctr"/>
+                      <a:r>
+                        <a:rPr lang="en-US" b="1" dirty="0" smtClean="0">
+                          <a:solidFill>
+                            <a:schemeClr val="tx1"/>
+                          </a:solidFill>
+                        </a:rPr>
+                        <a:t>ALS</a:t>
+                      </a:r>
+                      <a:endParaRPr lang="ru-RU" b="1" dirty="0">
+                        <a:solidFill>
+                          <a:schemeClr val="tx1"/>
+                        </a:solidFill>
+                      </a:endParaRPr>
+                    </a:p>
+                  </a:txBody>
+                  <a:tcPr/>
+                </a:tc>
+                <a:tc>
+                  <a:txBody>
+                    <a:bodyPr/>
+                    <a:lstStyle/>
+                    <a:p>
+                      <a:pPr algn="ctr"/>
+                      <a:r>
+                        <a:rPr lang="en-US" b="1" dirty="0" err="1" smtClean="0">
+                          <a:solidFill>
+                            <a:schemeClr val="tx1"/>
+                          </a:solidFill>
+                        </a:rPr>
+                        <a:t>NeuralMF</a:t>
+                      </a:r>
+                      <a:endParaRPr lang="ru-RU" b="1" dirty="0">
+                        <a:solidFill>
+                          <a:schemeClr val="tx1"/>
+                        </a:solidFill>
+                      </a:endParaRPr>
+                    </a:p>
+                  </a:txBody>
+                  <a:tcPr/>
+                </a:tc>
+                <a:extLst>
+                  <a:ext uri="{0D108BD9-81ED-4DB2-BD59-A6C34878D82A}">
+                    <a16:rowId xmlns:a16="http://schemas.microsoft.com/office/drawing/2014/main" val="3058563524"/>
+                  </a:ext>
+                </a:extLst>
+              </a:tr>
+              <a:tr h="370840">
+                <a:tc>
+                  <a:txBody>
+                    <a:bodyPr/>
+                    <a:lstStyle/>
+                    <a:p>
+                      <a:pPr algn="ctr"/>
+                      <a:r>
+                        <a:rPr lang="en-US" sz="1500" b="1" dirty="0" err="1" smtClean="0"/>
+                        <a:t>HitRate</a:t>
+                      </a:r>
+                      <a:r>
+                        <a:rPr lang="en-US" sz="1500" b="1" dirty="0" smtClean="0"/>
+                        <a:t> </a:t>
+                      </a:r>
+                      <a:r>
+                        <a:rPr lang="en-US" sz="1500" b="1" dirty="0" smtClean="0"/>
+                        <a:t>@ 5</a:t>
+                      </a:r>
+                      <a:endParaRPr lang="ru-RU" sz="1500" b="1" dirty="0"/>
+                    </a:p>
+                  </a:txBody>
+                  <a:tcPr/>
+                </a:tc>
+                <a:tc>
+                  <a:txBody>
+                    <a:bodyPr/>
+                    <a:lstStyle/>
+                    <a:p>
+                      <a:pPr algn="ctr"/>
+                      <a:r>
+                        <a:rPr lang="en-US" dirty="0" smtClean="0"/>
+                        <a:t>0,195</a:t>
+                      </a:r>
+                      <a:endParaRPr lang="ru-RU" dirty="0"/>
+                    </a:p>
+                  </a:txBody>
+                  <a:tcPr/>
+                </a:tc>
+                <a:tc>
+                  <a:txBody>
+                    <a:bodyPr/>
+                    <a:lstStyle/>
+                    <a:p>
+                      <a:pPr algn="ctr"/>
+                      <a:r>
+                        <a:rPr lang="en-US" dirty="0" smtClean="0"/>
+                        <a:t>0,210</a:t>
+                      </a:r>
+                      <a:endParaRPr lang="ru-RU" dirty="0"/>
+                    </a:p>
+                  </a:txBody>
+                  <a:tcPr/>
+                </a:tc>
+                <a:tc>
+                  <a:txBody>
+                    <a:bodyPr/>
+                    <a:lstStyle/>
+                    <a:p>
+                      <a:pPr algn="ctr"/>
+                      <a:r>
+                        <a:rPr lang="en-US" dirty="0" smtClean="0"/>
+                        <a:t>0,36</a:t>
+                      </a:r>
+                      <a:endParaRPr lang="ru-RU" dirty="0"/>
+                    </a:p>
+                  </a:txBody>
+                  <a:tcPr/>
+                </a:tc>
+                <a:extLst>
+                  <a:ext uri="{0D108BD9-81ED-4DB2-BD59-A6C34878D82A}">
+                    <a16:rowId xmlns:a16="http://schemas.microsoft.com/office/drawing/2014/main" val="2237968917"/>
+                  </a:ext>
+                </a:extLst>
+              </a:tr>
+            </a:tbl>
+          </a:graphicData>
+        </a:graphic>
+      </p:graphicFrame>
+      <p:pic>
+        <p:nvPicPr>
+          <p:cNvPr id="11" name="Объект 10"/>
+          <p:cNvPicPr>
+            <a:picLocks noGrp="1" noChangeAspect="1"/>
+          </p:cNvPicPr>
+          <p:nvPr>
+            <p:ph sz="half" idx="1"/>
+          </p:nvPr>
+        </p:nvPicPr>
+        <p:blipFill>
+          <a:blip r:embed="rId2" cstate="print">
+            <a:extLst>
+              <a:ext uri="{28A0092B-C50C-407E-A947-70E740481C1C}">
+                <a14:useLocalDpi xmlns:a14="http://schemas.microsoft.com/office/drawing/2010/main" val="0"/>
+              </a:ext>
+            </a:extLst>
+          </a:blip>
+          <a:stretch>
+            <a:fillRect/>
+          </a:stretch>
+        </p:blipFill>
+        <p:spPr>
+          <a:xfrm>
+            <a:off x="2487971" y="2035172"/>
+            <a:ext cx="5796831" cy="2875908"/>
+          </a:xfrm>
+        </p:spPr>
+      </p:pic>
+    </p:spTree>
+    <p:extLst>
+      <p:ext uri="{BB962C8B-B14F-4D97-AF65-F5344CB8AC3E}">
+        <p14:creationId xmlns:p14="http://schemas.microsoft.com/office/powerpoint/2010/main" val="174713306"/>
       </p:ext>
     </p:extLst>
   </p:cSld>

</xml_diff>

<commit_message>
add defectoscopy checker pet_proj
</commit_message>
<xml_diff>
--- a/reports/final_report/rep_final.pptx
+++ b/reports/final_report/rep_final.pptx
@@ -16,6 +16,7 @@
     <p:sldId id="265" r:id="rId10"/>
     <p:sldId id="266" r:id="rId11"/>
     <p:sldId id="267" r:id="rId12"/>
+    <p:sldId id="268" r:id="rId13"/>
   </p:sldIdLst>
   <p:sldSz cx="12192000" cy="6858000"/>
   <p:notesSz cx="6858000" cy="9144000"/>
@@ -314,7 +315,7 @@
           <a:p>
             <a:fld id="{8E181919-6A44-4E28-9780-FA7AF2B9EF29}" type="datetimeFigureOut">
               <a:rPr lang="ru-RU" smtClean="0"/>
-              <a:t>15.11.2021</a:t>
+              <a:t>16.11.2021</a:t>
             </a:fld>
             <a:endParaRPr lang="ru-RU"/>
           </a:p>
@@ -504,7 +505,7 @@
           <a:p>
             <a:fld id="{8E181919-6A44-4E28-9780-FA7AF2B9EF29}" type="datetimeFigureOut">
               <a:rPr lang="ru-RU" smtClean="0"/>
-              <a:t>15.11.2021</a:t>
+              <a:t>16.11.2021</a:t>
             </a:fld>
             <a:endParaRPr lang="ru-RU"/>
           </a:p>
@@ -684,7 +685,7 @@
           <a:p>
             <a:fld id="{8E181919-6A44-4E28-9780-FA7AF2B9EF29}" type="datetimeFigureOut">
               <a:rPr lang="ru-RU" smtClean="0"/>
-              <a:t>15.11.2021</a:t>
+              <a:t>16.11.2021</a:t>
             </a:fld>
             <a:endParaRPr lang="ru-RU"/>
           </a:p>
@@ -854,7 +855,7 @@
           <a:p>
             <a:fld id="{8E181919-6A44-4E28-9780-FA7AF2B9EF29}" type="datetimeFigureOut">
               <a:rPr lang="ru-RU" smtClean="0"/>
-              <a:t>15.11.2021</a:t>
+              <a:t>16.11.2021</a:t>
             </a:fld>
             <a:endParaRPr lang="ru-RU"/>
           </a:p>
@@ -1110,7 +1111,7 @@
           <a:p>
             <a:fld id="{8E181919-6A44-4E28-9780-FA7AF2B9EF29}" type="datetimeFigureOut">
               <a:rPr lang="ru-RU" smtClean="0"/>
-              <a:t>15.11.2021</a:t>
+              <a:t>16.11.2021</a:t>
             </a:fld>
             <a:endParaRPr lang="ru-RU"/>
           </a:p>
@@ -1398,7 +1399,7 @@
           <a:p>
             <a:fld id="{8E181919-6A44-4E28-9780-FA7AF2B9EF29}" type="datetimeFigureOut">
               <a:rPr lang="ru-RU" smtClean="0"/>
-              <a:t>15.11.2021</a:t>
+              <a:t>16.11.2021</a:t>
             </a:fld>
             <a:endParaRPr lang="ru-RU"/>
           </a:p>
@@ -1836,7 +1837,7 @@
           <a:p>
             <a:fld id="{8E181919-6A44-4E28-9780-FA7AF2B9EF29}" type="datetimeFigureOut">
               <a:rPr lang="ru-RU" smtClean="0"/>
-              <a:t>15.11.2021</a:t>
+              <a:t>16.11.2021</a:t>
             </a:fld>
             <a:endParaRPr lang="ru-RU"/>
           </a:p>
@@ -1954,7 +1955,7 @@
           <a:p>
             <a:fld id="{8E181919-6A44-4E28-9780-FA7AF2B9EF29}" type="datetimeFigureOut">
               <a:rPr lang="ru-RU" smtClean="0"/>
-              <a:t>15.11.2021</a:t>
+              <a:t>16.11.2021</a:t>
             </a:fld>
             <a:endParaRPr lang="ru-RU"/>
           </a:p>
@@ -2049,7 +2050,7 @@
           <a:p>
             <a:fld id="{8E181919-6A44-4E28-9780-FA7AF2B9EF29}" type="datetimeFigureOut">
               <a:rPr lang="ru-RU" smtClean="0"/>
-              <a:t>15.11.2021</a:t>
+              <a:t>16.11.2021</a:t>
             </a:fld>
             <a:endParaRPr lang="ru-RU"/>
           </a:p>
@@ -2405,7 +2406,7 @@
           <a:p>
             <a:fld id="{8E181919-6A44-4E28-9780-FA7AF2B9EF29}" type="datetimeFigureOut">
               <a:rPr lang="ru-RU" smtClean="0"/>
-              <a:t>15.11.2021</a:t>
+              <a:t>16.11.2021</a:t>
             </a:fld>
             <a:endParaRPr lang="ru-RU"/>
           </a:p>
@@ -2713,7 +2714,7 @@
           <a:p>
             <a:fld id="{8E181919-6A44-4E28-9780-FA7AF2B9EF29}" type="datetimeFigureOut">
               <a:rPr lang="ru-RU" smtClean="0"/>
-              <a:t>15.11.2021</a:t>
+              <a:t>16.11.2021</a:t>
             </a:fld>
             <a:endParaRPr lang="ru-RU"/>
           </a:p>
@@ -2949,7 +2950,7 @@
           <a:p>
             <a:fld id="{8E181919-6A44-4E28-9780-FA7AF2B9EF29}" type="datetimeFigureOut">
               <a:rPr lang="ru-RU" smtClean="0"/>
-              <a:t>15.11.2021</a:t>
+              <a:t>16.11.2021</a:t>
             </a:fld>
             <a:endParaRPr lang="ru-RU"/>
           </a:p>
@@ -3517,6 +3518,13 @@
   <p:clrMapOvr>
     <a:masterClrMapping/>
   </p:clrMapOvr>
+  <p:timing>
+    <p:tnLst>
+      <p:par>
+        <p:cTn id="1" dur="indefinite" restart="never" nodeType="tmRoot"/>
+      </p:par>
+    </p:tnLst>
+  </p:timing>
 </p:sld>
 </file>
 
@@ -3947,6 +3955,13 @@
   <p:clrMapOvr>
     <a:masterClrMapping/>
   </p:clrMapOvr>
+  <p:timing>
+    <p:tnLst>
+      <p:par>
+        <p:cTn id="1" dur="indefinite" restart="never" nodeType="tmRoot"/>
+      </p:par>
+    </p:tnLst>
+  </p:timing>
 </p:sld>
 </file>
 
@@ -4044,25 +4059,6 @@
       </p:sp>
       <p:sp>
         <p:nvSpPr>
-          <p:cNvPr id="3" name="Объект 2"/>
-          <p:cNvSpPr>
-            <a:spLocks noGrp="1"/>
-          </p:cNvSpPr>
-          <p:nvPr>
-            <p:ph sz="half" idx="1"/>
-          </p:nvPr>
-        </p:nvSpPr>
-        <p:spPr/>
-        <p:txBody>
-          <a:bodyPr/>
-          <a:lstStyle/>
-          <a:p>
-            <a:endParaRPr lang="ru-RU"/>
-          </a:p>
-        </p:txBody>
-      </p:sp>
-      <p:sp>
-        <p:nvSpPr>
           <p:cNvPr id="7" name="Объект 2"/>
           <p:cNvSpPr>
             <a:spLocks noGrp="1"/>
@@ -4073,18 +4069,266 @@
         </p:nvSpPr>
         <p:spPr>
           <a:xfrm>
-            <a:off x="6886956" y="1998134"/>
-            <a:ext cx="4663440" cy="3767328"/>
+            <a:off x="471428" y="2898066"/>
+            <a:ext cx="4412993" cy="1302460"/>
           </a:xfrm>
         </p:spPr>
         <p:txBody>
-          <a:bodyPr/>
+          <a:bodyPr>
+            <a:normAutofit/>
+          </a:bodyPr>
           <a:lstStyle/>
           <a:p>
-            <a:endParaRPr lang="ru-RU"/>
-          </a:p>
-        </p:txBody>
-      </p:sp>
+            <a:pPr>
+              <a:buFont typeface="Arial" panose="020B0604020202020204" pitchFamily="34" charset="0"/>
+              <a:buChar char="•"/>
+            </a:pPr>
+            <a:r>
+              <a:rPr lang="ru-RU" sz="2100" dirty="0"/>
+              <a:t> </a:t>
+            </a:r>
+            <a:r>
+              <a:rPr lang="ru-RU" sz="2100" dirty="0" smtClean="0"/>
+              <a:t>временной ряд</a:t>
+            </a:r>
+            <a:r>
+              <a:rPr lang="en-US" sz="2100" dirty="0" smtClean="0"/>
+              <a:t>: </a:t>
+            </a:r>
+            <a:r>
+              <a:rPr lang="ru-RU" sz="2100" dirty="0" smtClean="0"/>
+              <a:t>курс </a:t>
+            </a:r>
+            <a:r>
+              <a:rPr lang="en-US" sz="2100" dirty="0" err="1" smtClean="0"/>
+              <a:t>Ethereum</a:t>
+            </a:r>
+            <a:endParaRPr lang="ru-RU" sz="2100" dirty="0" smtClean="0"/>
+          </a:p>
+          <a:p>
+            <a:pPr>
+              <a:buFont typeface="Arial" panose="020B0604020202020204" pitchFamily="34" charset="0"/>
+              <a:buChar char="•"/>
+            </a:pPr>
+            <a:r>
+              <a:rPr lang="ru-RU" sz="2100" dirty="0"/>
+              <a:t> </a:t>
+            </a:r>
+            <a:r>
+              <a:rPr lang="ru-RU" sz="2100" dirty="0" smtClean="0"/>
+              <a:t>период</a:t>
+            </a:r>
+            <a:r>
+              <a:rPr lang="en-US" sz="2100" dirty="0" smtClean="0"/>
+              <a:t>:</a:t>
+            </a:r>
+            <a:r>
+              <a:rPr lang="ru-RU" sz="2100" dirty="0" smtClean="0"/>
+              <a:t> январь 2019 – январь 2021</a:t>
+            </a:r>
+          </a:p>
+          <a:p>
+            <a:pPr>
+              <a:buFont typeface="Arial" panose="020B0604020202020204" pitchFamily="34" charset="0"/>
+              <a:buChar char="•"/>
+            </a:pPr>
+            <a:r>
+              <a:rPr lang="ru-RU" sz="2100" dirty="0"/>
+              <a:t> </a:t>
+            </a:r>
+            <a:r>
+              <a:rPr lang="ru-RU" sz="2100" dirty="0" smtClean="0"/>
+              <a:t>построено 3 типа моделей</a:t>
+            </a:r>
+          </a:p>
+          <a:p>
+            <a:pPr marL="0" indent="0">
+              <a:buNone/>
+            </a:pPr>
+            <a:endParaRPr lang="ru-RU" dirty="0"/>
+          </a:p>
+        </p:txBody>
+      </p:sp>
+      <p:pic>
+        <p:nvPicPr>
+          <p:cNvPr id="8" name="Рисунок 7"/>
+          <p:cNvPicPr>
+            <a:picLocks noChangeAspect="1"/>
+          </p:cNvPicPr>
+          <p:nvPr/>
+        </p:nvPicPr>
+        <p:blipFill>
+          <a:blip r:embed="rId2">
+            <a:extLst>
+              <a:ext uri="{28A0092B-C50C-407E-A947-70E740481C1C}">
+                <a14:useLocalDpi xmlns:a14="http://schemas.microsoft.com/office/drawing/2010/main" val="0"/>
+              </a:ext>
+            </a:extLst>
+          </a:blip>
+          <a:stretch>
+            <a:fillRect/>
+          </a:stretch>
+        </p:blipFill>
+        <p:spPr>
+          <a:xfrm>
+            <a:off x="5027819" y="862542"/>
+            <a:ext cx="3414112" cy="1891382"/>
+          </a:xfrm>
+          <a:prstGeom prst="rect">
+            <a:avLst/>
+          </a:prstGeom>
+        </p:spPr>
+      </p:pic>
+      <p:pic>
+        <p:nvPicPr>
+          <p:cNvPr id="9" name="Рисунок 8"/>
+          <p:cNvPicPr>
+            <a:picLocks/>
+          </p:cNvPicPr>
+          <p:nvPr/>
+        </p:nvPicPr>
+        <p:blipFill>
+          <a:blip r:embed="rId3">
+            <a:extLst>
+              <a:ext uri="{28A0092B-C50C-407E-A947-70E740481C1C}">
+                <a14:useLocalDpi xmlns:a14="http://schemas.microsoft.com/office/drawing/2010/main" val="0"/>
+              </a:ext>
+            </a:extLst>
+          </a:blip>
+          <a:stretch>
+            <a:fillRect/>
+          </a:stretch>
+        </p:blipFill>
+        <p:spPr>
+          <a:xfrm>
+            <a:off x="8441931" y="863924"/>
+            <a:ext cx="3412800" cy="1890000"/>
+          </a:xfrm>
+          <a:prstGeom prst="rect">
+            <a:avLst/>
+          </a:prstGeom>
+        </p:spPr>
+      </p:pic>
+      <p:pic>
+        <p:nvPicPr>
+          <p:cNvPr id="11" name="Рисунок 10"/>
+          <p:cNvPicPr>
+            <a:picLocks/>
+          </p:cNvPicPr>
+          <p:nvPr/>
+        </p:nvPicPr>
+        <p:blipFill>
+          <a:blip r:embed="rId4">
+            <a:extLst>
+              <a:ext uri="{28A0092B-C50C-407E-A947-70E740481C1C}">
+                <a14:useLocalDpi xmlns:a14="http://schemas.microsoft.com/office/drawing/2010/main" val="0"/>
+              </a:ext>
+            </a:extLst>
+          </a:blip>
+          <a:stretch>
+            <a:fillRect/>
+          </a:stretch>
+        </p:blipFill>
+        <p:spPr>
+          <a:xfrm>
+            <a:off x="5029131" y="2753924"/>
+            <a:ext cx="3412800" cy="1890000"/>
+          </a:xfrm>
+          <a:prstGeom prst="rect">
+            <a:avLst/>
+          </a:prstGeom>
+        </p:spPr>
+      </p:pic>
+      <p:pic>
+        <p:nvPicPr>
+          <p:cNvPr id="12" name="Рисунок 11"/>
+          <p:cNvPicPr>
+            <a:picLocks/>
+          </p:cNvPicPr>
+          <p:nvPr/>
+        </p:nvPicPr>
+        <p:blipFill>
+          <a:blip r:embed="rId5">
+            <a:extLst>
+              <a:ext uri="{28A0092B-C50C-407E-A947-70E740481C1C}">
+                <a14:useLocalDpi xmlns:a14="http://schemas.microsoft.com/office/drawing/2010/main" val="0"/>
+              </a:ext>
+            </a:extLst>
+          </a:blip>
+          <a:stretch>
+            <a:fillRect/>
+          </a:stretch>
+        </p:blipFill>
+        <p:spPr>
+          <a:xfrm>
+            <a:off x="8441931" y="2753924"/>
+            <a:ext cx="3412800" cy="1890000"/>
+          </a:xfrm>
+          <a:prstGeom prst="rect">
+            <a:avLst/>
+          </a:prstGeom>
+        </p:spPr>
+      </p:pic>
+      <p:pic>
+        <p:nvPicPr>
+          <p:cNvPr id="13" name="Рисунок 12"/>
+          <p:cNvPicPr>
+            <a:picLocks/>
+          </p:cNvPicPr>
+          <p:nvPr/>
+        </p:nvPicPr>
+        <p:blipFill>
+          <a:blip r:embed="rId6">
+            <a:extLst>
+              <a:ext uri="{28A0092B-C50C-407E-A947-70E740481C1C}">
+                <a14:useLocalDpi xmlns:a14="http://schemas.microsoft.com/office/drawing/2010/main" val="0"/>
+              </a:ext>
+            </a:extLst>
+          </a:blip>
+          <a:stretch>
+            <a:fillRect/>
+          </a:stretch>
+        </p:blipFill>
+        <p:spPr>
+          <a:xfrm>
+            <a:off x="5027819" y="4758010"/>
+            <a:ext cx="3412800" cy="1890000"/>
+          </a:xfrm>
+          <a:prstGeom prst="rect">
+            <a:avLst/>
+          </a:prstGeom>
+        </p:spPr>
+      </p:pic>
+      <p:pic>
+        <p:nvPicPr>
+          <p:cNvPr id="14" name="Рисунок 13"/>
+          <p:cNvPicPr>
+            <a:picLocks/>
+          </p:cNvPicPr>
+          <p:nvPr/>
+        </p:nvPicPr>
+        <p:blipFill>
+          <a:blip r:embed="rId7">
+            <a:extLst>
+              <a:ext uri="{28A0092B-C50C-407E-A947-70E740481C1C}">
+                <a14:useLocalDpi xmlns:a14="http://schemas.microsoft.com/office/drawing/2010/main" val="0"/>
+              </a:ext>
+            </a:extLst>
+          </a:blip>
+          <a:stretch>
+            <a:fillRect/>
+          </a:stretch>
+        </p:blipFill>
+        <p:spPr>
+          <a:xfrm>
+            <a:off x="8440619" y="4758010"/>
+            <a:ext cx="3412800" cy="1890000"/>
+          </a:xfrm>
+          <a:prstGeom prst="rect">
+            <a:avLst/>
+          </a:prstGeom>
+        </p:spPr>
+      </p:pic>
     </p:spTree>
     <p:extLst>
       <p:ext uri="{BB962C8B-B14F-4D97-AF65-F5344CB8AC3E}">
@@ -4095,6 +4339,184 @@
   <p:clrMapOvr>
     <a:masterClrMapping/>
   </p:clrMapOvr>
+  <p:timing>
+    <p:tnLst>
+      <p:par>
+        <p:cTn id="1" dur="indefinite" restart="never" nodeType="tmRoot"/>
+      </p:par>
+    </p:tnLst>
+  </p:timing>
+</p:sld>
+</file>
+
+<file path=ppt/slides/slide12.xml><?xml version="1.0" encoding="utf-8"?>
+<p:sld xmlns:a="http://schemas.openxmlformats.org/drawingml/2006/main" xmlns:r="http://schemas.openxmlformats.org/officeDocument/2006/relationships" xmlns:p="http://schemas.openxmlformats.org/presentationml/2006/main">
+  <p:cSld>
+    <p:spTree>
+      <p:nvGrpSpPr>
+        <p:cNvPr id="1" name=""/>
+        <p:cNvGrpSpPr/>
+        <p:nvPr/>
+      </p:nvGrpSpPr>
+      <p:grpSpPr>
+        <a:xfrm>
+          <a:off x="0" y="0"/>
+          <a:ext cx="0" cy="0"/>
+          <a:chOff x="0" y="0"/>
+          <a:chExt cx="0" cy="0"/>
+        </a:xfrm>
+      </p:grpSpPr>
+      <p:sp>
+        <p:nvSpPr>
+          <p:cNvPr id="2" name="Заголовок 1">
+            <a:extLst>
+              <a:ext uri="{FF2B5EF4-FFF2-40B4-BE49-F238E27FC236}">
+                <a16:creationId xmlns:a16="http://schemas.microsoft.com/office/drawing/2014/main" id="{1D5ABEB9-EC30-4BFF-889B-D5AD2601C96D}"/>
+              </a:ext>
+            </a:extLst>
+          </p:cNvPr>
+          <p:cNvSpPr>
+            <a:spLocks noGrp="1"/>
+          </p:cNvSpPr>
+          <p:nvPr>
+            <p:ph type="title"/>
+          </p:nvPr>
+        </p:nvSpPr>
+        <p:spPr>
+          <a:xfrm>
+            <a:off x="0" y="0"/>
+            <a:ext cx="10772775" cy="862542"/>
+          </a:xfrm>
+        </p:spPr>
+        <p:txBody>
+          <a:bodyPr>
+            <a:normAutofit fontScale="90000"/>
+          </a:bodyPr>
+          <a:lstStyle/>
+          <a:p>
+            <a:r>
+              <a:rPr lang="ru-RU" sz="4000" b="1" dirty="0" smtClean="0">
+                <a:solidFill>
+                  <a:schemeClr val="tx1"/>
+                </a:solidFill>
+              </a:rPr>
+              <a:t>Задачи по текущим проектам группы</a:t>
+            </a:r>
+            <a:br>
+              <a:rPr lang="ru-RU" sz="4000" b="1" dirty="0" smtClean="0">
+                <a:solidFill>
+                  <a:schemeClr val="tx1"/>
+                </a:solidFill>
+              </a:rPr>
+            </a:br>
+            <a:r>
+              <a:rPr lang="ru-RU" sz="3000" b="1" dirty="0" smtClean="0">
+                <a:solidFill>
+                  <a:schemeClr val="tx1"/>
+                </a:solidFill>
+              </a:rPr>
+              <a:t>Дефектоскопия.</a:t>
+            </a:r>
+            <a:endParaRPr lang="ru-RU" sz="3000" b="1" dirty="0">
+              <a:solidFill>
+                <a:schemeClr val="tx1"/>
+              </a:solidFill>
+            </a:endParaRPr>
+          </a:p>
+        </p:txBody>
+      </p:sp>
+      <p:sp>
+        <p:nvSpPr>
+          <p:cNvPr id="6" name="Объект 5">
+            <a:extLst>
+              <a:ext uri="{FF2B5EF4-FFF2-40B4-BE49-F238E27FC236}">
+                <a16:creationId xmlns:a16="http://schemas.microsoft.com/office/drawing/2014/main" id="{1F50CAFC-03E4-4949-B9A9-538EDB2BD8FF}"/>
+              </a:ext>
+            </a:extLst>
+          </p:cNvPr>
+          <p:cNvSpPr>
+            <a:spLocks noGrp="1"/>
+          </p:cNvSpPr>
+          <p:nvPr>
+            <p:ph sz="half" idx="1"/>
+          </p:nvPr>
+        </p:nvSpPr>
+        <p:spPr/>
+        <p:txBody>
+          <a:bodyPr>
+            <a:normAutofit/>
+          </a:bodyPr>
+          <a:lstStyle/>
+          <a:p>
+            <a:pPr>
+              <a:buFont typeface="Arial" panose="020B0604020202020204" pitchFamily="34" charset="0"/>
+              <a:buChar char="•"/>
+            </a:pPr>
+            <a:endParaRPr lang="en-US" dirty="0" smtClean="0">
+              <a:solidFill>
+                <a:schemeClr val="tx1"/>
+              </a:solidFill>
+            </a:endParaRPr>
+          </a:p>
+        </p:txBody>
+      </p:sp>
+      <p:sp>
+        <p:nvSpPr>
+          <p:cNvPr id="7" name="Объект 5">
+            <a:extLst>
+              <a:ext uri="{FF2B5EF4-FFF2-40B4-BE49-F238E27FC236}">
+                <a16:creationId xmlns:a16="http://schemas.microsoft.com/office/drawing/2014/main" id="{1F50CAFC-03E4-4949-B9A9-538EDB2BD8FF}"/>
+              </a:ext>
+            </a:extLst>
+          </p:cNvPr>
+          <p:cNvSpPr>
+            <a:spLocks noGrp="1"/>
+          </p:cNvSpPr>
+          <p:nvPr>
+            <p:ph sz="half" idx="1"/>
+          </p:nvPr>
+        </p:nvSpPr>
+        <p:spPr>
+          <a:xfrm>
+            <a:off x="6382131" y="1998134"/>
+            <a:ext cx="4663440" cy="3767328"/>
+          </a:xfrm>
+        </p:spPr>
+        <p:txBody>
+          <a:bodyPr>
+            <a:normAutofit/>
+          </a:bodyPr>
+          <a:lstStyle/>
+          <a:p>
+            <a:pPr>
+              <a:buFont typeface="Arial" panose="020B0604020202020204" pitchFamily="34" charset="0"/>
+              <a:buChar char="•"/>
+            </a:pPr>
+            <a:endParaRPr lang="en-US" dirty="0" smtClean="0">
+              <a:solidFill>
+                <a:schemeClr val="tx1"/>
+              </a:solidFill>
+            </a:endParaRPr>
+          </a:p>
+        </p:txBody>
+      </p:sp>
+    </p:spTree>
+    <p:extLst>
+      <p:ext uri="{BB962C8B-B14F-4D97-AF65-F5344CB8AC3E}">
+        <p14:creationId xmlns:p14="http://schemas.microsoft.com/office/powerpoint/2010/main" val="1901606624"/>
+      </p:ext>
+    </p:extLst>
+  </p:cSld>
+  <p:clrMapOvr>
+    <a:masterClrMapping/>
+  </p:clrMapOvr>
+  <p:timing>
+    <p:tnLst>
+      <p:par>
+        <p:cTn id="1" dur="indefinite" restart="never" nodeType="tmRoot"/>
+      </p:par>
+    </p:tnLst>
+  </p:timing>
 </p:sld>
 </file>
 
@@ -4962,6 +5384,13 @@
   <p:clrMapOvr>
     <a:masterClrMapping/>
   </p:clrMapOvr>
+  <p:timing>
+    <p:tnLst>
+      <p:par>
+        <p:cTn id="1" dur="indefinite" restart="never" nodeType="tmRoot"/>
+      </p:par>
+    </p:tnLst>
+  </p:timing>
 </p:sld>
 </file>
 
@@ -5506,6 +5935,13 @@
   <p:clrMapOvr>
     <a:masterClrMapping/>
   </p:clrMapOvr>
+  <p:timing>
+    <p:tnLst>
+      <p:par>
+        <p:cTn id="1" dur="indefinite" restart="never" nodeType="tmRoot"/>
+      </p:par>
+    </p:tnLst>
+  </p:timing>
 </p:sld>
 </file>
 
@@ -5804,6 +6240,13 @@
   <p:clrMapOvr>
     <a:masterClrMapping/>
   </p:clrMapOvr>
+  <p:timing>
+    <p:tnLst>
+      <p:par>
+        <p:cTn id="1" dur="indefinite" restart="never" nodeType="tmRoot"/>
+      </p:par>
+    </p:tnLst>
+  </p:timing>
 </p:sld>
 </file>
 
@@ -5933,6 +6376,13 @@
   <p:clrMapOvr>
     <a:masterClrMapping/>
   </p:clrMapOvr>
+  <p:timing>
+    <p:tnLst>
+      <p:par>
+        <p:cTn id="1" dur="indefinite" restart="never" nodeType="tmRoot"/>
+      </p:par>
+    </p:tnLst>
+  </p:timing>
 </p:sld>
 </file>
 
@@ -6068,6 +6518,13 @@
   <p:clrMapOvr>
     <a:masterClrMapping/>
   </p:clrMapOvr>
+  <p:timing>
+    <p:tnLst>
+      <p:par>
+        <p:cTn id="1" dur="indefinite" restart="never" nodeType="tmRoot"/>
+      </p:par>
+    </p:tnLst>
+  </p:timing>
 </p:sld>
 </file>
 
@@ -6238,6 +6695,13 @@
   <p:clrMapOvr>
     <a:masterClrMapping/>
   </p:clrMapOvr>
+  <p:timing>
+    <p:tnLst>
+      <p:par>
+        <p:cTn id="1" dur="indefinite" restart="never" nodeType="tmRoot"/>
+      </p:par>
+    </p:tnLst>
+  </p:timing>
 </p:sld>
 </file>
 
@@ -6971,6 +7435,13 @@
   <p:clrMapOvr>
     <a:masterClrMapping/>
   </p:clrMapOvr>
+  <p:timing>
+    <p:tnLst>
+      <p:par>
+        <p:cTn id="1" dur="indefinite" restart="never" nodeType="tmRoot"/>
+      </p:par>
+    </p:tnLst>
+  </p:timing>
 </p:sld>
 </file>
 
@@ -7076,14 +7547,14 @@
             <p:ph sz="half" idx="1"/>
             <p:extLst>
               <p:ext uri="{D42A27DB-BD31-4B8C-83A1-F6EECF244321}">
-                <p14:modId xmlns:p14="http://schemas.microsoft.com/office/powerpoint/2010/main" val="3085808158"/>
+                <p14:modId xmlns:p14="http://schemas.microsoft.com/office/powerpoint/2010/main" val="1511845963"/>
               </p:ext>
             </p:extLst>
           </p:nvPr>
         </p:nvGraphicFramePr>
         <p:xfrm>
-          <a:off x="2619373" y="1293492"/>
-          <a:ext cx="5665428" cy="741680"/>
+          <a:off x="1802422" y="1293492"/>
+          <a:ext cx="8161460" cy="1112520"/>
         </p:xfrm>
         <a:graphic>
           <a:graphicData uri="http://schemas.openxmlformats.org/drawingml/2006/table">
@@ -7092,28 +7563,28 @@
                 <a:tableStyleId>{5C22544A-7EE6-4342-B048-85BDC9FD1C3A}</a:tableStyleId>
               </a:tblPr>
               <a:tblGrid>
-                <a:gridCol w="1416357">
+                <a:gridCol w="2319408">
                   <a:extLst>
                     <a:ext uri="{9D8B030D-6E8A-4147-A177-3AD203B41FA5}">
                       <a16:colId xmlns:a16="http://schemas.microsoft.com/office/drawing/2014/main" val="3632553540"/>
                     </a:ext>
                   </a:extLst>
                 </a:gridCol>
-                <a:gridCol w="1416357">
+                <a:gridCol w="1841286">
                   <a:extLst>
                     <a:ext uri="{9D8B030D-6E8A-4147-A177-3AD203B41FA5}">
                       <a16:colId xmlns:a16="http://schemas.microsoft.com/office/drawing/2014/main" val="2437699176"/>
                     </a:ext>
                   </a:extLst>
                 </a:gridCol>
-                <a:gridCol w="1416357">
+                <a:gridCol w="2014224">
                   <a:extLst>
                     <a:ext uri="{9D8B030D-6E8A-4147-A177-3AD203B41FA5}">
                       <a16:colId xmlns:a16="http://schemas.microsoft.com/office/drawing/2014/main" val="249235384"/>
                     </a:ext>
                   </a:extLst>
                 </a:gridCol>
-                <a:gridCol w="1416357">
+                <a:gridCol w="1986542">
                   <a:extLst>
                     <a:ext uri="{9D8B030D-6E8A-4147-A177-3AD203B41FA5}">
                       <a16:colId xmlns:a16="http://schemas.microsoft.com/office/drawing/2014/main" val="1739793482"/>
@@ -7134,7 +7605,7 @@
                             <a:schemeClr val="tx1"/>
                           </a:solidFill>
                         </a:rPr>
-                        <a:t>-</a:t>
+                        <a:t>Metric/Model</a:t>
                       </a:r>
                       <a:endParaRPr lang="ru-RU" dirty="0">
                         <a:solidFill>
@@ -7244,18 +7715,14 @@
                     <a:p>
                       <a:pPr algn="ctr"/>
                       <a:r>
-                        <a:rPr lang="en-US" sz="1500" b="1" dirty="0" err="1" smtClean="0"/>
-                        <a:t>HitRate</a:t>
+                        <a:rPr lang="en-US" sz="1200" b="1" dirty="0" smtClean="0"/>
+                        <a:t>Mean Precision </a:t>
                       </a:r>
                       <a:r>
-                        <a:rPr lang="en-US" sz="1500" b="1" dirty="0" smtClean="0"/>
-                        <a:t> </a:t>
-                      </a:r>
-                      <a:r>
-                        <a:rPr lang="en-US" sz="1500" b="1" dirty="0" smtClean="0"/>
+                        <a:rPr lang="en-US" sz="1200" b="1" dirty="0" smtClean="0"/>
                         <a:t>@ 5</a:t>
                       </a:r>
-                      <a:endParaRPr lang="ru-RU" sz="1500" b="1" dirty="0"/>
+                      <a:endParaRPr lang="ru-RU" sz="1200" b="1" dirty="0"/>
                     </a:p>
                   </a:txBody>
                   <a:tcPr/>
@@ -7267,10 +7734,10 @@
                     <a:p>
                       <a:pPr algn="ctr"/>
                       <a:r>
-                        <a:rPr lang="en-US" dirty="0" smtClean="0"/>
+                        <a:rPr lang="en-US" sz="1200" dirty="0" smtClean="0"/>
                         <a:t>0,195</a:t>
                       </a:r>
-                      <a:endParaRPr lang="ru-RU" dirty="0"/>
+                      <a:endParaRPr lang="ru-RU" sz="1200" dirty="0"/>
                     </a:p>
                   </a:txBody>
                   <a:tcPr/>
@@ -7282,10 +7749,10 @@
                     <a:p>
                       <a:pPr algn="ctr"/>
                       <a:r>
-                        <a:rPr lang="en-US" dirty="0" smtClean="0"/>
-                        <a:t>0,210</a:t>
+                        <a:rPr lang="en-US" sz="1200" dirty="0" smtClean="0"/>
+                        <a:t>0,203</a:t>
                       </a:r>
-                      <a:endParaRPr lang="ru-RU" dirty="0"/>
+                      <a:endParaRPr lang="ru-RU" sz="1200" dirty="0"/>
                     </a:p>
                   </a:txBody>
                   <a:tcPr/>
@@ -7297,10 +7764,10 @@
                     <a:p>
                       <a:pPr algn="ctr"/>
                       <a:r>
-                        <a:rPr lang="en-US" dirty="0" smtClean="0"/>
-                        <a:t>0,36</a:t>
+                        <a:rPr lang="en-US" sz="1200" dirty="0" smtClean="0"/>
+                        <a:t>0,430</a:t>
                       </a:r>
-                      <a:endParaRPr lang="ru-RU" dirty="0"/>
+                      <a:endParaRPr lang="ru-RU" sz="1200" dirty="0"/>
                     </a:p>
                   </a:txBody>
                   <a:tcPr/>
@@ -7311,22 +7778,87 @@
                   </a:ext>
                 </a:extLst>
               </a:tr>
+              <a:tr h="370840">
+                <a:tc>
+                  <a:txBody>
+                    <a:bodyPr/>
+                    <a:lstStyle/>
+                    <a:p>
+                      <a:pPr algn="ctr"/>
+                      <a:r>
+                        <a:rPr lang="en-US" sz="1200" b="1" dirty="0" smtClean="0"/>
+                        <a:t>Mean Average Precision @ 5</a:t>
+                      </a:r>
+                      <a:endParaRPr lang="ru-RU" sz="1200" b="1" dirty="0"/>
+                    </a:p>
+                  </a:txBody>
+                  <a:tcPr/>
+                </a:tc>
+                <a:tc>
+                  <a:txBody>
+                    <a:bodyPr/>
+                    <a:lstStyle/>
+                    <a:p>
+                      <a:pPr algn="ctr"/>
+                      <a:r>
+                        <a:rPr lang="en-US" sz="1200" dirty="0" smtClean="0"/>
+                        <a:t>0,107</a:t>
+                      </a:r>
+                      <a:endParaRPr lang="ru-RU" sz="1200" dirty="0"/>
+                    </a:p>
+                  </a:txBody>
+                  <a:tcPr/>
+                </a:tc>
+                <a:tc>
+                  <a:txBody>
+                    <a:bodyPr/>
+                    <a:lstStyle/>
+                    <a:p>
+                      <a:pPr algn="ctr"/>
+                      <a:r>
+                        <a:rPr lang="en-US" sz="1200" dirty="0" smtClean="0"/>
+                        <a:t>0,117</a:t>
+                      </a:r>
+                      <a:endParaRPr lang="ru-RU" sz="1200" dirty="0"/>
+                    </a:p>
+                  </a:txBody>
+                  <a:tcPr/>
+                </a:tc>
+                <a:tc>
+                  <a:txBody>
+                    <a:bodyPr/>
+                    <a:lstStyle/>
+                    <a:p>
+                      <a:pPr algn="ctr"/>
+                      <a:r>
+                        <a:rPr lang="en-US" sz="1200" dirty="0" smtClean="0"/>
+                        <a:t>0,300</a:t>
+                      </a:r>
+                      <a:endParaRPr lang="ru-RU" sz="1200" dirty="0"/>
+                    </a:p>
+                  </a:txBody>
+                  <a:tcPr/>
+                </a:tc>
+                <a:extLst>
+                  <a:ext uri="{0D108BD9-81ED-4DB2-BD59-A6C34878D82A}">
+                    <a16:rowId xmlns:a16="http://schemas.microsoft.com/office/drawing/2014/main" val="4152955685"/>
+                  </a:ext>
+                </a:extLst>
+              </a:tr>
             </a:tbl>
           </a:graphicData>
         </a:graphic>
       </p:graphicFrame>
       <p:pic>
         <p:nvPicPr>
-          <p:cNvPr id="11" name="Объект 10"/>
+          <p:cNvPr id="4" name="Рисунок 3"/>
           <p:cNvPicPr>
-            <a:picLocks noGrp="1" noChangeAspect="1"/>
+            <a:picLocks noChangeAspect="1"/>
           </p:cNvPicPr>
-          <p:nvPr>
-            <p:ph sz="half" idx="1"/>
-          </p:nvPr>
+          <p:nvPr/>
         </p:nvPicPr>
         <p:blipFill>
-          <a:blip r:embed="rId2" cstate="print">
+          <a:blip r:embed="rId2">
             <a:extLst>
               <a:ext uri="{28A0092B-C50C-407E-A947-70E740481C1C}">
                 <a14:useLocalDpi xmlns:a14="http://schemas.microsoft.com/office/drawing/2010/main" val="0"/>
@@ -7339,9 +7871,12 @@
         </p:blipFill>
         <p:spPr>
           <a:xfrm>
-            <a:off x="2487971" y="2035172"/>
-            <a:ext cx="5796831" cy="2875908"/>
+            <a:off x="1510822" y="2406012"/>
+            <a:ext cx="8453060" cy="4193709"/>
           </a:xfrm>
+          <a:prstGeom prst="rect">
+            <a:avLst/>
+          </a:prstGeom>
         </p:spPr>
       </p:pic>
     </p:spTree>
@@ -7354,6 +7889,13 @@
   <p:clrMapOvr>
     <a:masterClrMapping/>
   </p:clrMapOvr>
+  <p:timing>
+    <p:tnLst>
+      <p:par>
+        <p:cTn id="1" dur="indefinite" restart="never" nodeType="tmRoot"/>
+      </p:par>
+    </p:tnLst>
+  </p:timing>
 </p:sld>
 </file>
 

</xml_diff>

<commit_message>
need add metrics to defectoscopy model
</commit_message>
<xml_diff>
--- a/reports/final_report/rep_final.pptx
+++ b/reports/final_report/rep_final.pptx
@@ -16,7 +16,8 @@
     <p:sldId id="265" r:id="rId10"/>
     <p:sldId id="266" r:id="rId11"/>
     <p:sldId id="267" r:id="rId12"/>
-    <p:sldId id="268" r:id="rId13"/>
+    <p:sldId id="269" r:id="rId13"/>
+    <p:sldId id="268" r:id="rId14"/>
   </p:sldIdLst>
   <p:sldSz cx="12192000" cy="6858000"/>
   <p:notesSz cx="6858000" cy="9144000"/>
@@ -4415,6 +4416,177 @@
                   <a:schemeClr val="tx1"/>
                 </a:solidFill>
               </a:rPr>
+              <a:t>Классификация дефектов в рамках задачи дефектоскопии.</a:t>
+            </a:r>
+            <a:endParaRPr lang="ru-RU" sz="3000" b="1" dirty="0">
+              <a:solidFill>
+                <a:schemeClr val="tx1"/>
+              </a:solidFill>
+            </a:endParaRPr>
+          </a:p>
+        </p:txBody>
+      </p:sp>
+      <p:sp>
+        <p:nvSpPr>
+          <p:cNvPr id="6" name="Объект 5">
+            <a:extLst>
+              <a:ext uri="{FF2B5EF4-FFF2-40B4-BE49-F238E27FC236}">
+                <a16:creationId xmlns:a16="http://schemas.microsoft.com/office/drawing/2014/main" id="{1F50CAFC-03E4-4949-B9A9-538EDB2BD8FF}"/>
+              </a:ext>
+            </a:extLst>
+          </p:cNvPr>
+          <p:cNvSpPr>
+            <a:spLocks noGrp="1"/>
+          </p:cNvSpPr>
+          <p:nvPr>
+            <p:ph sz="half" idx="1"/>
+          </p:nvPr>
+        </p:nvSpPr>
+        <p:spPr/>
+        <p:txBody>
+          <a:bodyPr>
+            <a:normAutofit/>
+          </a:bodyPr>
+          <a:lstStyle/>
+          <a:p>
+            <a:pPr>
+              <a:buFont typeface="Arial" panose="020B0604020202020204" pitchFamily="34" charset="0"/>
+              <a:buChar char="•"/>
+            </a:pPr>
+            <a:endParaRPr lang="en-US" dirty="0" smtClean="0">
+              <a:solidFill>
+                <a:schemeClr val="tx1"/>
+              </a:solidFill>
+            </a:endParaRPr>
+          </a:p>
+        </p:txBody>
+      </p:sp>
+      <p:sp>
+        <p:nvSpPr>
+          <p:cNvPr id="7" name="Объект 5">
+            <a:extLst>
+              <a:ext uri="{FF2B5EF4-FFF2-40B4-BE49-F238E27FC236}">
+                <a16:creationId xmlns:a16="http://schemas.microsoft.com/office/drawing/2014/main" id="{1F50CAFC-03E4-4949-B9A9-538EDB2BD8FF}"/>
+              </a:ext>
+            </a:extLst>
+          </p:cNvPr>
+          <p:cNvSpPr>
+            <a:spLocks noGrp="1"/>
+          </p:cNvSpPr>
+          <p:nvPr>
+            <p:ph sz="half" idx="1"/>
+          </p:nvPr>
+        </p:nvSpPr>
+        <p:spPr>
+          <a:xfrm>
+            <a:off x="6382131" y="1998134"/>
+            <a:ext cx="4663440" cy="3767328"/>
+          </a:xfrm>
+        </p:spPr>
+        <p:txBody>
+          <a:bodyPr>
+            <a:normAutofit/>
+          </a:bodyPr>
+          <a:lstStyle/>
+          <a:p>
+            <a:pPr>
+              <a:buFont typeface="Arial" panose="020B0604020202020204" pitchFamily="34" charset="0"/>
+              <a:buChar char="•"/>
+            </a:pPr>
+            <a:endParaRPr lang="en-US" dirty="0" smtClean="0">
+              <a:solidFill>
+                <a:schemeClr val="tx1"/>
+              </a:solidFill>
+            </a:endParaRPr>
+          </a:p>
+        </p:txBody>
+      </p:sp>
+    </p:spTree>
+    <p:extLst>
+      <p:ext uri="{BB962C8B-B14F-4D97-AF65-F5344CB8AC3E}">
+        <p14:creationId xmlns:p14="http://schemas.microsoft.com/office/powerpoint/2010/main" val="88169996"/>
+      </p:ext>
+    </p:extLst>
+  </p:cSld>
+  <p:clrMapOvr>
+    <a:masterClrMapping/>
+  </p:clrMapOvr>
+  <p:timing>
+    <p:tnLst>
+      <p:par>
+        <p:cTn id="1" dur="indefinite" restart="never" nodeType="tmRoot"/>
+      </p:par>
+    </p:tnLst>
+  </p:timing>
+</p:sld>
+</file>
+
+<file path=ppt/slides/slide13.xml><?xml version="1.0" encoding="utf-8"?>
+<p:sld xmlns:a="http://schemas.openxmlformats.org/drawingml/2006/main" xmlns:r="http://schemas.openxmlformats.org/officeDocument/2006/relationships" xmlns:p="http://schemas.openxmlformats.org/presentationml/2006/main">
+  <p:cSld>
+    <p:spTree>
+      <p:nvGrpSpPr>
+        <p:cNvPr id="1" name=""/>
+        <p:cNvGrpSpPr/>
+        <p:nvPr/>
+      </p:nvGrpSpPr>
+      <p:grpSpPr>
+        <a:xfrm>
+          <a:off x="0" y="0"/>
+          <a:ext cx="0" cy="0"/>
+          <a:chOff x="0" y="0"/>
+          <a:chExt cx="0" cy="0"/>
+        </a:xfrm>
+      </p:grpSpPr>
+      <p:sp>
+        <p:nvSpPr>
+          <p:cNvPr id="2" name="Заголовок 1">
+            <a:extLst>
+              <a:ext uri="{FF2B5EF4-FFF2-40B4-BE49-F238E27FC236}">
+                <a16:creationId xmlns:a16="http://schemas.microsoft.com/office/drawing/2014/main" id="{1D5ABEB9-EC30-4BFF-889B-D5AD2601C96D}"/>
+              </a:ext>
+            </a:extLst>
+          </p:cNvPr>
+          <p:cNvSpPr>
+            <a:spLocks noGrp="1"/>
+          </p:cNvSpPr>
+          <p:nvPr>
+            <p:ph type="title"/>
+          </p:nvPr>
+        </p:nvSpPr>
+        <p:spPr>
+          <a:xfrm>
+            <a:off x="0" y="0"/>
+            <a:ext cx="10772775" cy="862542"/>
+          </a:xfrm>
+        </p:spPr>
+        <p:txBody>
+          <a:bodyPr>
+            <a:normAutofit fontScale="90000"/>
+          </a:bodyPr>
+          <a:lstStyle/>
+          <a:p>
+            <a:r>
+              <a:rPr lang="ru-RU" sz="4000" b="1" dirty="0" smtClean="0">
+                <a:solidFill>
+                  <a:schemeClr val="tx1"/>
+                </a:solidFill>
+              </a:rPr>
+              <a:t>Задачи по текущим проектам группы</a:t>
+            </a:r>
+            <a:br>
+              <a:rPr lang="ru-RU" sz="4000" b="1" dirty="0" smtClean="0">
+                <a:solidFill>
+                  <a:schemeClr val="tx1"/>
+                </a:solidFill>
+              </a:rPr>
+            </a:br>
+            <a:r>
+              <a:rPr lang="ru-RU" sz="3000" b="1" dirty="0" smtClean="0">
+                <a:solidFill>
+                  <a:schemeClr val="tx1"/>
+                </a:solidFill>
+              </a:rPr>
               <a:t>Дефектоскопия.</a:t>
             </a:r>
             <a:endParaRPr lang="ru-RU" sz="3000" b="1" dirty="0">
@@ -7716,11 +7888,7 @@
                       <a:pPr algn="ctr"/>
                       <a:r>
                         <a:rPr lang="en-US" sz="1200" b="1" dirty="0" smtClean="0"/>
-                        <a:t>Mean Precision </a:t>
-                      </a:r>
-                      <a:r>
-                        <a:rPr lang="en-US" sz="1200" b="1" dirty="0" smtClean="0"/>
-                        <a:t>@ 5</a:t>
+                        <a:t>Mean Precision @ 5</a:t>
                       </a:r>
                       <a:endParaRPr lang="ru-RU" sz="1200" b="1" dirty="0"/>
                     </a:p>

</xml_diff>